<commit_message>
Fix bug in DG Archive section, object diagrams
</commit_message>
<xml_diff>
--- a/docs/diagrams/ArchiveStepByStepDiagram.pptx
+++ b/docs/diagrams/ArchiveStepByStepDiagram.pptx
@@ -104,6 +104,11 @@
       </a:defRPr>
     </a:lvl9pPr>
   </p:defaultTextStyle>
+  <p:extLst>
+    <p:ext uri="{EFAFB233-063F-42B5-8137-9DF3F51BA10A}">
+      <p15:sldGuideLst xmlns:p15="http://schemas.microsoft.com/office/powerpoint/2012/main"/>
+    </p:ext>
+  </p:extLst>
 </p:presentation>
 </file>
 
@@ -268,7 +273,7 @@
           <a:p>
             <a:fld id="{A7417AA8-BE79-472F-BF05-40633832C527}" type="datetimeFigureOut">
               <a:rPr lang="en-SG" smtClean="0"/>
-              <a:t>22/10/2020</a:t>
+              <a:t>27/10/2020</a:t>
             </a:fld>
             <a:endParaRPr lang="en-SG"/>
           </a:p>
@@ -468,7 +473,7 @@
           <a:p>
             <a:fld id="{A7417AA8-BE79-472F-BF05-40633832C527}" type="datetimeFigureOut">
               <a:rPr lang="en-SG" smtClean="0"/>
-              <a:t>22/10/2020</a:t>
+              <a:t>27/10/2020</a:t>
             </a:fld>
             <a:endParaRPr lang="en-SG"/>
           </a:p>
@@ -678,7 +683,7 @@
           <a:p>
             <a:fld id="{A7417AA8-BE79-472F-BF05-40633832C527}" type="datetimeFigureOut">
               <a:rPr lang="en-SG" smtClean="0"/>
-              <a:t>22/10/2020</a:t>
+              <a:t>27/10/2020</a:t>
             </a:fld>
             <a:endParaRPr lang="en-SG"/>
           </a:p>
@@ -878,7 +883,7 @@
           <a:p>
             <a:fld id="{A7417AA8-BE79-472F-BF05-40633832C527}" type="datetimeFigureOut">
               <a:rPr lang="en-SG" smtClean="0"/>
-              <a:t>22/10/2020</a:t>
+              <a:t>27/10/2020</a:t>
             </a:fld>
             <a:endParaRPr lang="en-SG"/>
           </a:p>
@@ -1154,7 +1159,7 @@
           <a:p>
             <a:fld id="{A7417AA8-BE79-472F-BF05-40633832C527}" type="datetimeFigureOut">
               <a:rPr lang="en-SG" smtClean="0"/>
-              <a:t>22/10/2020</a:t>
+              <a:t>27/10/2020</a:t>
             </a:fld>
             <a:endParaRPr lang="en-SG"/>
           </a:p>
@@ -1422,7 +1427,7 @@
           <a:p>
             <a:fld id="{A7417AA8-BE79-472F-BF05-40633832C527}" type="datetimeFigureOut">
               <a:rPr lang="en-SG" smtClean="0"/>
-              <a:t>22/10/2020</a:t>
+              <a:t>27/10/2020</a:t>
             </a:fld>
             <a:endParaRPr lang="en-SG"/>
           </a:p>
@@ -1837,7 +1842,7 @@
           <a:p>
             <a:fld id="{A7417AA8-BE79-472F-BF05-40633832C527}" type="datetimeFigureOut">
               <a:rPr lang="en-SG" smtClean="0"/>
-              <a:t>22/10/2020</a:t>
+              <a:t>27/10/2020</a:t>
             </a:fld>
             <a:endParaRPr lang="en-SG"/>
           </a:p>
@@ -1979,7 +1984,7 @@
           <a:p>
             <a:fld id="{A7417AA8-BE79-472F-BF05-40633832C527}" type="datetimeFigureOut">
               <a:rPr lang="en-SG" smtClean="0"/>
-              <a:t>22/10/2020</a:t>
+              <a:t>27/10/2020</a:t>
             </a:fld>
             <a:endParaRPr lang="en-SG"/>
           </a:p>
@@ -2092,7 +2097,7 @@
           <a:p>
             <a:fld id="{A7417AA8-BE79-472F-BF05-40633832C527}" type="datetimeFigureOut">
               <a:rPr lang="en-SG" smtClean="0"/>
-              <a:t>22/10/2020</a:t>
+              <a:t>27/10/2020</a:t>
             </a:fld>
             <a:endParaRPr lang="en-SG"/>
           </a:p>
@@ -2405,7 +2410,7 @@
           <a:p>
             <a:fld id="{A7417AA8-BE79-472F-BF05-40633832C527}" type="datetimeFigureOut">
               <a:rPr lang="en-SG" smtClean="0"/>
-              <a:t>22/10/2020</a:t>
+              <a:t>27/10/2020</a:t>
             </a:fld>
             <a:endParaRPr lang="en-SG"/>
           </a:p>
@@ -2694,7 +2699,7 @@
           <a:p>
             <a:fld id="{A7417AA8-BE79-472F-BF05-40633832C527}" type="datetimeFigureOut">
               <a:rPr lang="en-SG" smtClean="0"/>
-              <a:t>22/10/2020</a:t>
+              <a:t>27/10/2020</a:t>
             </a:fld>
             <a:endParaRPr lang="en-SG"/>
           </a:p>
@@ -2937,7 +2942,7 @@
           <a:p>
             <a:fld id="{A7417AA8-BE79-472F-BF05-40633832C527}" type="datetimeFigureOut">
               <a:rPr lang="en-SG" smtClean="0"/>
-              <a:t>22/10/2020</a:t>
+              <a:t>27/10/2020</a:t>
             </a:fld>
             <a:endParaRPr lang="en-SG"/>
           </a:p>
@@ -3356,10 +3361,10 @@
       </p:grpSpPr>
       <p:sp>
         <p:nvSpPr>
-          <p:cNvPr id="21" name="Rectangle 20">
-            <a:extLst>
-              <a:ext uri="{FF2B5EF4-FFF2-40B4-BE49-F238E27FC236}">
-                <a16:creationId xmlns:a16="http://schemas.microsoft.com/office/drawing/2014/main" id="{7C545F0F-F371-4B90-8AA9-14EBFB1D01A7}"/>
+          <p:cNvPr id="60" name="Rectangle 59">
+            <a:extLst>
+              <a:ext uri="{FF2B5EF4-FFF2-40B4-BE49-F238E27FC236}">
+                <a16:creationId xmlns:a16="http://schemas.microsoft.com/office/drawing/2014/main" id="{01CB9A59-9CCD-4690-B730-2E5F26C02E96}"/>
               </a:ext>
             </a:extLst>
           </p:cNvPr>
@@ -3368,8 +3373,116 @@
         </p:nvSpPr>
         <p:spPr>
           <a:xfrm>
-            <a:off x="1249960" y="125835"/>
-            <a:ext cx="8397379" cy="1979802"/>
+            <a:off x="1325459" y="4540611"/>
+            <a:ext cx="8128933" cy="2007965"/>
+          </a:xfrm>
+          <a:prstGeom prst="rect">
+            <a:avLst/>
+          </a:prstGeom>
+          <a:solidFill>
+            <a:schemeClr val="bg1"/>
+          </a:solidFill>
+          <a:ln>
+            <a:solidFill>
+              <a:schemeClr val="bg1"/>
+            </a:solidFill>
+          </a:ln>
+        </p:spPr>
+        <p:style>
+          <a:lnRef idx="2">
+            <a:schemeClr val="accent1">
+              <a:shade val="50000"/>
+            </a:schemeClr>
+          </a:lnRef>
+          <a:fillRef idx="1">
+            <a:schemeClr val="accent1"/>
+          </a:fillRef>
+          <a:effectRef idx="0">
+            <a:schemeClr val="accent1"/>
+          </a:effectRef>
+          <a:fontRef idx="minor">
+            <a:schemeClr val="lt1"/>
+          </a:fontRef>
+        </p:style>
+        <p:txBody>
+          <a:bodyPr rtlCol="0" anchor="ctr"/>
+          <a:lstStyle/>
+          <a:p>
+            <a:pPr algn="ctr"/>
+            <a:endParaRPr lang="en-SG"/>
+          </a:p>
+        </p:txBody>
+      </p:sp>
+      <p:sp>
+        <p:nvSpPr>
+          <p:cNvPr id="59" name="Rectangle 58">
+            <a:extLst>
+              <a:ext uri="{FF2B5EF4-FFF2-40B4-BE49-F238E27FC236}">
+                <a16:creationId xmlns:a16="http://schemas.microsoft.com/office/drawing/2014/main" id="{920138A6-8EDA-4F65-8AD4-50979A13FB4F}"/>
+              </a:ext>
+            </a:extLst>
+          </p:cNvPr>
+          <p:cNvSpPr/>
+          <p:nvPr/>
+        </p:nvSpPr>
+        <p:spPr>
+          <a:xfrm>
+            <a:off x="1384182" y="2362360"/>
+            <a:ext cx="8128933" cy="2007965"/>
+          </a:xfrm>
+          <a:prstGeom prst="rect">
+            <a:avLst/>
+          </a:prstGeom>
+          <a:solidFill>
+            <a:schemeClr val="bg1"/>
+          </a:solidFill>
+          <a:ln>
+            <a:solidFill>
+              <a:schemeClr val="bg1"/>
+            </a:solidFill>
+          </a:ln>
+        </p:spPr>
+        <p:style>
+          <a:lnRef idx="2">
+            <a:schemeClr val="accent1">
+              <a:shade val="50000"/>
+            </a:schemeClr>
+          </a:lnRef>
+          <a:fillRef idx="1">
+            <a:schemeClr val="accent1"/>
+          </a:fillRef>
+          <a:effectRef idx="0">
+            <a:schemeClr val="accent1"/>
+          </a:effectRef>
+          <a:fontRef idx="minor">
+            <a:schemeClr val="lt1"/>
+          </a:fontRef>
+        </p:style>
+        <p:txBody>
+          <a:bodyPr rtlCol="0" anchor="ctr"/>
+          <a:lstStyle/>
+          <a:p>
+            <a:pPr algn="ctr"/>
+            <a:endParaRPr lang="en-SG"/>
+          </a:p>
+        </p:txBody>
+      </p:sp>
+      <p:sp>
+        <p:nvSpPr>
+          <p:cNvPr id="2" name="Rectangle 1">
+            <a:extLst>
+              <a:ext uri="{FF2B5EF4-FFF2-40B4-BE49-F238E27FC236}">
+                <a16:creationId xmlns:a16="http://schemas.microsoft.com/office/drawing/2014/main" id="{1DCF871A-BAFB-40AF-B998-3F23BC3AAD06}"/>
+              </a:ext>
+            </a:extLst>
+          </p:cNvPr>
+          <p:cNvSpPr/>
+          <p:nvPr/>
+        </p:nvSpPr>
+        <p:spPr>
+          <a:xfrm>
+            <a:off x="1384183" y="109057"/>
+            <a:ext cx="8128933" cy="2007965"/>
           </a:xfrm>
           <a:prstGeom prst="rect">
             <a:avLst/>
@@ -3499,10 +3612,10 @@
       </p:sp>
       <p:sp>
         <p:nvSpPr>
-          <p:cNvPr id="9" name="Rectangle 8">
-            <a:extLst>
-              <a:ext uri="{FF2B5EF4-FFF2-40B4-BE49-F238E27FC236}">
-                <a16:creationId xmlns:a16="http://schemas.microsoft.com/office/drawing/2014/main" id="{D61F58C8-57AD-402C-AA6D-26887D617B25}"/>
+          <p:cNvPr id="15" name="Rectangle 14">
+            <a:extLst>
+              <a:ext uri="{FF2B5EF4-FFF2-40B4-BE49-F238E27FC236}">
+                <a16:creationId xmlns:a16="http://schemas.microsoft.com/office/drawing/2014/main" id="{6E809ADB-0AEA-4889-A3FF-673E0D748CBA}"/>
               </a:ext>
             </a:extLst>
           </p:cNvPr>
@@ -3511,8 +3624,8 @@
         </p:nvSpPr>
         <p:spPr>
           <a:xfrm>
-            <a:off x="3826778" y="939272"/>
-            <a:ext cx="1279321" cy="338554"/>
+            <a:off x="1957431" y="940474"/>
+            <a:ext cx="1371600" cy="338554"/>
           </a:xfrm>
           <a:prstGeom prst="rect">
             <a:avLst/>
@@ -3553,7 +3666,7 @@
                   <a:schemeClr val="tx1"/>
                 </a:solidFill>
               </a:rPr>
-              <a:t>ben:Person</a:t>
+              <a:t>david:Person</a:t>
             </a:r>
             <a:endParaRPr lang="en-SG" sz="1400" u="sng" dirty="0">
               <a:solidFill>
@@ -3565,10 +3678,10 @@
       </p:sp>
       <p:sp>
         <p:nvSpPr>
-          <p:cNvPr id="10" name="Rectangle 9">
-            <a:extLst>
-              <a:ext uri="{FF2B5EF4-FFF2-40B4-BE49-F238E27FC236}">
-                <a16:creationId xmlns:a16="http://schemas.microsoft.com/office/drawing/2014/main" id="{5B87E4C3-9009-434B-81E4-539DB0E1D185}"/>
+          <p:cNvPr id="16" name="Rectangle 15">
+            <a:extLst>
+              <a:ext uri="{FF2B5EF4-FFF2-40B4-BE49-F238E27FC236}">
+                <a16:creationId xmlns:a16="http://schemas.microsoft.com/office/drawing/2014/main" id="{A09920D5-07E5-4C73-A228-8413CCC075E3}"/>
               </a:ext>
             </a:extLst>
           </p:cNvPr>
@@ -3577,8 +3690,8 @@
         </p:nvSpPr>
         <p:spPr>
           <a:xfrm>
-            <a:off x="3826778" y="1259050"/>
-            <a:ext cx="1279321" cy="338554"/>
+            <a:off x="1957431" y="1260252"/>
+            <a:ext cx="1371600" cy="338554"/>
           </a:xfrm>
           <a:prstGeom prst="rect">
             <a:avLst/>
@@ -3627,147 +3740,7 @@
                   <a:schemeClr val="tx1"/>
                 </a:solidFill>
               </a:rPr>
-              <a:t>: false</a:t>
-            </a:r>
-            <a:endParaRPr lang="en-SG" sz="1400" dirty="0">
-              <a:solidFill>
-                <a:schemeClr val="tx1"/>
-              </a:solidFill>
-            </a:endParaRPr>
-          </a:p>
-        </p:txBody>
-      </p:sp>
-      <p:sp>
-        <p:nvSpPr>
-          <p:cNvPr id="15" name="Rectangle 14">
-            <a:extLst>
-              <a:ext uri="{FF2B5EF4-FFF2-40B4-BE49-F238E27FC236}">
-                <a16:creationId xmlns:a16="http://schemas.microsoft.com/office/drawing/2014/main" id="{6E809ADB-0AEA-4889-A3FF-673E0D748CBA}"/>
-              </a:ext>
-            </a:extLst>
-          </p:cNvPr>
-          <p:cNvSpPr/>
-          <p:nvPr/>
-        </p:nvSpPr>
-        <p:spPr>
-          <a:xfrm>
-            <a:off x="1957431" y="940474"/>
-            <a:ext cx="1279321" cy="338554"/>
-          </a:xfrm>
-          <a:prstGeom prst="rect">
-            <a:avLst/>
-          </a:prstGeom>
-          <a:solidFill>
-            <a:srgbClr val="FFFF00"/>
-          </a:solidFill>
-          <a:ln>
-            <a:solidFill>
-              <a:schemeClr val="tx1"/>
-            </a:solidFill>
-          </a:ln>
-        </p:spPr>
-        <p:style>
-          <a:lnRef idx="2">
-            <a:schemeClr val="accent1">
-              <a:shade val="50000"/>
-            </a:schemeClr>
-          </a:lnRef>
-          <a:fillRef idx="1">
-            <a:schemeClr val="accent1"/>
-          </a:fillRef>
-          <a:effectRef idx="0">
-            <a:schemeClr val="accent1"/>
-          </a:effectRef>
-          <a:fontRef idx="minor">
-            <a:schemeClr val="lt1"/>
-          </a:fontRef>
-        </p:style>
-        <p:txBody>
-          <a:bodyPr rtlCol="0" anchor="ctr"/>
-          <a:lstStyle/>
-          <a:p>
-            <a:pPr algn="ctr"/>
-            <a:r>
-              <a:rPr lang="en-US" sz="1400" u="sng" dirty="0" err="1">
-                <a:solidFill>
-                  <a:schemeClr val="tx1"/>
-                </a:solidFill>
-              </a:rPr>
-              <a:t>david:Person</a:t>
-            </a:r>
-            <a:endParaRPr lang="en-SG" sz="1400" u="sng" dirty="0">
-              <a:solidFill>
-                <a:schemeClr val="tx1"/>
-              </a:solidFill>
-            </a:endParaRPr>
-          </a:p>
-        </p:txBody>
-      </p:sp>
-      <p:sp>
-        <p:nvSpPr>
-          <p:cNvPr id="16" name="Rectangle 15">
-            <a:extLst>
-              <a:ext uri="{FF2B5EF4-FFF2-40B4-BE49-F238E27FC236}">
-                <a16:creationId xmlns:a16="http://schemas.microsoft.com/office/drawing/2014/main" id="{A09920D5-07E5-4C73-A228-8413CCC075E3}"/>
-              </a:ext>
-            </a:extLst>
-          </p:cNvPr>
-          <p:cNvSpPr/>
-          <p:nvPr/>
-        </p:nvSpPr>
-        <p:spPr>
-          <a:xfrm>
-            <a:off x="1957431" y="1260252"/>
-            <a:ext cx="1279321" cy="338554"/>
-          </a:xfrm>
-          <a:prstGeom prst="rect">
-            <a:avLst/>
-          </a:prstGeom>
-          <a:solidFill>
-            <a:srgbClr val="FFFF00"/>
-          </a:solidFill>
-          <a:ln>
-            <a:solidFill>
-              <a:schemeClr val="tx1"/>
-            </a:solidFill>
-          </a:ln>
-        </p:spPr>
-        <p:style>
-          <a:lnRef idx="2">
-            <a:schemeClr val="accent1">
-              <a:shade val="50000"/>
-            </a:schemeClr>
-          </a:lnRef>
-          <a:fillRef idx="1">
-            <a:schemeClr val="accent1"/>
-          </a:fillRef>
-          <a:effectRef idx="0">
-            <a:schemeClr val="accent1"/>
-          </a:effectRef>
-          <a:fontRef idx="minor">
-            <a:schemeClr val="lt1"/>
-          </a:fontRef>
-        </p:style>
-        <p:txBody>
-          <a:bodyPr rtlCol="0" anchor="ctr"/>
-          <a:lstStyle/>
-          <a:p>
-            <a:pPr algn="ctr"/>
-            <a:r>
-              <a:rPr lang="en-US" sz="1400" dirty="0" err="1">
-                <a:solidFill>
-                  <a:schemeClr val="tx1"/>
-                </a:solidFill>
-              </a:rPr>
-              <a:t>isArchive</a:t>
-            </a:r>
-            <a:r>
-              <a:rPr lang="en-US" sz="1400" dirty="0">
-                <a:solidFill>
-                  <a:schemeClr val="tx1"/>
-                </a:solidFill>
-              </a:rPr>
-              <a:t>: false</a:t>
+              <a:t> = false</a:t>
             </a:r>
             <a:endParaRPr lang="en-SG" sz="1400" dirty="0">
               <a:solidFill>
@@ -4000,437 +3973,6 @@
       </p:sp>
       <p:sp>
         <p:nvSpPr>
-          <p:cNvPr id="22" name="Rectangle 21">
-            <a:extLst>
-              <a:ext uri="{FF2B5EF4-FFF2-40B4-BE49-F238E27FC236}">
-                <a16:creationId xmlns:a16="http://schemas.microsoft.com/office/drawing/2014/main" id="{63BA2BD4-13AB-4BC9-ACA4-DFF863E5D963}"/>
-              </a:ext>
-            </a:extLst>
-          </p:cNvPr>
-          <p:cNvSpPr/>
-          <p:nvPr/>
-        </p:nvSpPr>
-        <p:spPr>
-          <a:xfrm>
-            <a:off x="1249960" y="2398457"/>
-            <a:ext cx="8397379" cy="1979802"/>
-          </a:xfrm>
-          <a:prstGeom prst="rect">
-            <a:avLst/>
-          </a:prstGeom>
-          <a:solidFill>
-            <a:schemeClr val="bg1"/>
-          </a:solidFill>
-          <a:ln>
-            <a:solidFill>
-              <a:schemeClr val="bg1"/>
-            </a:solidFill>
-          </a:ln>
-        </p:spPr>
-        <p:style>
-          <a:lnRef idx="2">
-            <a:schemeClr val="accent1">
-              <a:shade val="50000"/>
-            </a:schemeClr>
-          </a:lnRef>
-          <a:fillRef idx="1">
-            <a:schemeClr val="accent1"/>
-          </a:fillRef>
-          <a:effectRef idx="0">
-            <a:schemeClr val="accent1"/>
-          </a:effectRef>
-          <a:fontRef idx="minor">
-            <a:schemeClr val="lt1"/>
-          </a:fontRef>
-        </p:style>
-        <p:txBody>
-          <a:bodyPr rtlCol="0" anchor="ctr"/>
-          <a:lstStyle/>
-          <a:p>
-            <a:pPr algn="ctr"/>
-            <a:endParaRPr lang="en-SG"/>
-          </a:p>
-        </p:txBody>
-      </p:sp>
-      <p:sp>
-        <p:nvSpPr>
-          <p:cNvPr id="23" name="Rectangle 22">
-            <a:extLst>
-              <a:ext uri="{FF2B5EF4-FFF2-40B4-BE49-F238E27FC236}">
-                <a16:creationId xmlns:a16="http://schemas.microsoft.com/office/drawing/2014/main" id="{38A296AB-6325-4AE7-987A-03E89CE76963}"/>
-              </a:ext>
-            </a:extLst>
-          </p:cNvPr>
-          <p:cNvSpPr/>
-          <p:nvPr/>
-        </p:nvSpPr>
-        <p:spPr>
-          <a:xfrm>
-            <a:off x="1753299" y="2574626"/>
-            <a:ext cx="3548543" cy="1553361"/>
-          </a:xfrm>
-          <a:prstGeom prst="rect">
-            <a:avLst/>
-          </a:prstGeom>
-          <a:noFill/>
-          <a:ln>
-            <a:solidFill>
-              <a:schemeClr val="tx1"/>
-            </a:solidFill>
-          </a:ln>
-        </p:spPr>
-        <p:style>
-          <a:lnRef idx="2">
-            <a:schemeClr val="accent1">
-              <a:shade val="50000"/>
-            </a:schemeClr>
-          </a:lnRef>
-          <a:fillRef idx="1">
-            <a:schemeClr val="accent1"/>
-          </a:fillRef>
-          <a:effectRef idx="0">
-            <a:schemeClr val="accent1"/>
-          </a:effectRef>
-          <a:fontRef idx="minor">
-            <a:schemeClr val="lt1"/>
-          </a:fontRef>
-        </p:style>
-        <p:txBody>
-          <a:bodyPr rtlCol="0" anchor="ctr"/>
-          <a:lstStyle/>
-          <a:p>
-            <a:pPr algn="ctr"/>
-            <a:endParaRPr lang="en-SG"/>
-          </a:p>
-        </p:txBody>
-      </p:sp>
-      <p:sp>
-        <p:nvSpPr>
-          <p:cNvPr id="24" name="TextBox 23">
-            <a:extLst>
-              <a:ext uri="{FF2B5EF4-FFF2-40B4-BE49-F238E27FC236}">
-                <a16:creationId xmlns:a16="http://schemas.microsoft.com/office/drawing/2014/main" id="{1550D805-7C01-4C91-BD43-66A15F633A4E}"/>
-              </a:ext>
-            </a:extLst>
-          </p:cNvPr>
-          <p:cNvSpPr txBox="1"/>
-          <p:nvPr/>
-        </p:nvSpPr>
-        <p:spPr>
-          <a:xfrm>
-            <a:off x="2927757" y="2657018"/>
-            <a:ext cx="1199626" cy="338554"/>
-          </a:xfrm>
-          <a:prstGeom prst="rect">
-            <a:avLst/>
-          </a:prstGeom>
-          <a:noFill/>
-        </p:spPr>
-        <p:txBody>
-          <a:bodyPr wrap="square" rtlCol="0">
-            <a:spAutoFit/>
-          </a:bodyPr>
-          <a:lstStyle/>
-          <a:p>
-            <a:pPr algn="ctr"/>
-            <a:r>
-              <a:rPr lang="en-US" sz="1600" dirty="0" err="1"/>
-              <a:t>ClientList</a:t>
-            </a:r>
-            <a:endParaRPr lang="en-SG" dirty="0"/>
-          </a:p>
-        </p:txBody>
-      </p:sp>
-      <p:sp>
-        <p:nvSpPr>
-          <p:cNvPr id="25" name="Rectangle 24">
-            <a:extLst>
-              <a:ext uri="{FF2B5EF4-FFF2-40B4-BE49-F238E27FC236}">
-                <a16:creationId xmlns:a16="http://schemas.microsoft.com/office/drawing/2014/main" id="{4D3DFD4E-F694-4872-BF87-5CCA5F76650C}"/>
-              </a:ext>
-            </a:extLst>
-          </p:cNvPr>
-          <p:cNvSpPr/>
-          <p:nvPr/>
-        </p:nvSpPr>
-        <p:spPr>
-          <a:xfrm>
-            <a:off x="3826778" y="3211894"/>
-            <a:ext cx="1279321" cy="338554"/>
-          </a:xfrm>
-          <a:prstGeom prst="rect">
-            <a:avLst/>
-          </a:prstGeom>
-          <a:solidFill>
-            <a:srgbClr val="FFFF00"/>
-          </a:solidFill>
-          <a:ln>
-            <a:solidFill>
-              <a:schemeClr val="tx1"/>
-            </a:solidFill>
-          </a:ln>
-        </p:spPr>
-        <p:style>
-          <a:lnRef idx="2">
-            <a:schemeClr val="accent1">
-              <a:shade val="50000"/>
-            </a:schemeClr>
-          </a:lnRef>
-          <a:fillRef idx="1">
-            <a:schemeClr val="accent1"/>
-          </a:fillRef>
-          <a:effectRef idx="0">
-            <a:schemeClr val="accent1"/>
-          </a:effectRef>
-          <a:fontRef idx="minor">
-            <a:schemeClr val="lt1"/>
-          </a:fontRef>
-        </p:style>
-        <p:txBody>
-          <a:bodyPr rtlCol="0" anchor="ctr"/>
-          <a:lstStyle/>
-          <a:p>
-            <a:pPr algn="ctr"/>
-            <a:r>
-              <a:rPr lang="en-US" sz="1400" u="sng" dirty="0" err="1">
-                <a:solidFill>
-                  <a:schemeClr val="tx1"/>
-                </a:solidFill>
-              </a:rPr>
-              <a:t>ben:Person</a:t>
-            </a:r>
-            <a:endParaRPr lang="en-SG" sz="1400" u="sng" dirty="0">
-              <a:solidFill>
-                <a:schemeClr val="tx1"/>
-              </a:solidFill>
-            </a:endParaRPr>
-          </a:p>
-        </p:txBody>
-      </p:sp>
-      <p:sp>
-        <p:nvSpPr>
-          <p:cNvPr id="26" name="Rectangle 25">
-            <a:extLst>
-              <a:ext uri="{FF2B5EF4-FFF2-40B4-BE49-F238E27FC236}">
-                <a16:creationId xmlns:a16="http://schemas.microsoft.com/office/drawing/2014/main" id="{BF3CE7DC-AEF9-485A-80D7-BF60F062B63E}"/>
-              </a:ext>
-            </a:extLst>
-          </p:cNvPr>
-          <p:cNvSpPr/>
-          <p:nvPr/>
-        </p:nvSpPr>
-        <p:spPr>
-          <a:xfrm>
-            <a:off x="3826778" y="3531672"/>
-            <a:ext cx="1279321" cy="338554"/>
-          </a:xfrm>
-          <a:prstGeom prst="rect">
-            <a:avLst/>
-          </a:prstGeom>
-          <a:solidFill>
-            <a:srgbClr val="FFFF00"/>
-          </a:solidFill>
-          <a:ln>
-            <a:solidFill>
-              <a:schemeClr val="tx1"/>
-            </a:solidFill>
-          </a:ln>
-        </p:spPr>
-        <p:style>
-          <a:lnRef idx="2">
-            <a:schemeClr val="accent1">
-              <a:shade val="50000"/>
-            </a:schemeClr>
-          </a:lnRef>
-          <a:fillRef idx="1">
-            <a:schemeClr val="accent1"/>
-          </a:fillRef>
-          <a:effectRef idx="0">
-            <a:schemeClr val="accent1"/>
-          </a:effectRef>
-          <a:fontRef idx="minor">
-            <a:schemeClr val="lt1"/>
-          </a:fontRef>
-        </p:style>
-        <p:txBody>
-          <a:bodyPr rtlCol="0" anchor="ctr"/>
-          <a:lstStyle/>
-          <a:p>
-            <a:pPr algn="ctr"/>
-            <a:r>
-              <a:rPr lang="en-US" sz="1400" dirty="0" err="1">
-                <a:solidFill>
-                  <a:schemeClr val="tx1"/>
-                </a:solidFill>
-              </a:rPr>
-              <a:t>isArchive</a:t>
-            </a:r>
-            <a:r>
-              <a:rPr lang="en-US" sz="1400" dirty="0">
-                <a:solidFill>
-                  <a:schemeClr val="tx1"/>
-                </a:solidFill>
-              </a:rPr>
-              <a:t>: </a:t>
-            </a:r>
-            <a:r>
-              <a:rPr lang="en-US" sz="1400" b="1" dirty="0">
-                <a:solidFill>
-                  <a:schemeClr val="tx1"/>
-                </a:solidFill>
-              </a:rPr>
-              <a:t>true</a:t>
-            </a:r>
-            <a:endParaRPr lang="en-SG" sz="1400" b="1" dirty="0">
-              <a:solidFill>
-                <a:schemeClr val="tx1"/>
-              </a:solidFill>
-            </a:endParaRPr>
-          </a:p>
-        </p:txBody>
-      </p:sp>
-      <p:sp>
-        <p:nvSpPr>
-          <p:cNvPr id="27" name="Rectangle 26">
-            <a:extLst>
-              <a:ext uri="{FF2B5EF4-FFF2-40B4-BE49-F238E27FC236}">
-                <a16:creationId xmlns:a16="http://schemas.microsoft.com/office/drawing/2014/main" id="{EFC5E775-C63B-4E2C-B930-190A4D0A4CD6}"/>
-              </a:ext>
-            </a:extLst>
-          </p:cNvPr>
-          <p:cNvSpPr/>
-          <p:nvPr/>
-        </p:nvSpPr>
-        <p:spPr>
-          <a:xfrm>
-            <a:off x="1957431" y="3213096"/>
-            <a:ext cx="1279321" cy="338554"/>
-          </a:xfrm>
-          <a:prstGeom prst="rect">
-            <a:avLst/>
-          </a:prstGeom>
-          <a:solidFill>
-            <a:srgbClr val="FFFF00"/>
-          </a:solidFill>
-          <a:ln>
-            <a:solidFill>
-              <a:schemeClr val="tx1"/>
-            </a:solidFill>
-          </a:ln>
-        </p:spPr>
-        <p:style>
-          <a:lnRef idx="2">
-            <a:schemeClr val="accent1">
-              <a:shade val="50000"/>
-            </a:schemeClr>
-          </a:lnRef>
-          <a:fillRef idx="1">
-            <a:schemeClr val="accent1"/>
-          </a:fillRef>
-          <a:effectRef idx="0">
-            <a:schemeClr val="accent1"/>
-          </a:effectRef>
-          <a:fontRef idx="minor">
-            <a:schemeClr val="lt1"/>
-          </a:fontRef>
-        </p:style>
-        <p:txBody>
-          <a:bodyPr rtlCol="0" anchor="ctr"/>
-          <a:lstStyle/>
-          <a:p>
-            <a:pPr algn="ctr"/>
-            <a:r>
-              <a:rPr lang="en-US" sz="1400" u="sng" dirty="0" err="1">
-                <a:solidFill>
-                  <a:schemeClr val="tx1"/>
-                </a:solidFill>
-              </a:rPr>
-              <a:t>david:Person</a:t>
-            </a:r>
-            <a:endParaRPr lang="en-SG" sz="1400" u="sng" dirty="0">
-              <a:solidFill>
-                <a:schemeClr val="tx1"/>
-              </a:solidFill>
-            </a:endParaRPr>
-          </a:p>
-        </p:txBody>
-      </p:sp>
-      <p:sp>
-        <p:nvSpPr>
-          <p:cNvPr id="28" name="Rectangle 27">
-            <a:extLst>
-              <a:ext uri="{FF2B5EF4-FFF2-40B4-BE49-F238E27FC236}">
-                <a16:creationId xmlns:a16="http://schemas.microsoft.com/office/drawing/2014/main" id="{1D3BDD2F-A88A-40A6-8D7F-4B6112E525F4}"/>
-              </a:ext>
-            </a:extLst>
-          </p:cNvPr>
-          <p:cNvSpPr/>
-          <p:nvPr/>
-        </p:nvSpPr>
-        <p:spPr>
-          <a:xfrm>
-            <a:off x="1957431" y="3532874"/>
-            <a:ext cx="1279321" cy="338554"/>
-          </a:xfrm>
-          <a:prstGeom prst="rect">
-            <a:avLst/>
-          </a:prstGeom>
-          <a:solidFill>
-            <a:srgbClr val="FFFF00"/>
-          </a:solidFill>
-          <a:ln>
-            <a:solidFill>
-              <a:schemeClr val="tx1"/>
-            </a:solidFill>
-          </a:ln>
-        </p:spPr>
-        <p:style>
-          <a:lnRef idx="2">
-            <a:schemeClr val="accent1">
-              <a:shade val="50000"/>
-            </a:schemeClr>
-          </a:lnRef>
-          <a:fillRef idx="1">
-            <a:schemeClr val="accent1"/>
-          </a:fillRef>
-          <a:effectRef idx="0">
-            <a:schemeClr val="accent1"/>
-          </a:effectRef>
-          <a:fontRef idx="minor">
-            <a:schemeClr val="lt1"/>
-          </a:fontRef>
-        </p:style>
-        <p:txBody>
-          <a:bodyPr rtlCol="0" anchor="ctr"/>
-          <a:lstStyle/>
-          <a:p>
-            <a:pPr algn="ctr"/>
-            <a:r>
-              <a:rPr lang="en-US" sz="1400" dirty="0" err="1">
-                <a:solidFill>
-                  <a:schemeClr val="tx1"/>
-                </a:solidFill>
-              </a:rPr>
-              <a:t>isArchive</a:t>
-            </a:r>
-            <a:r>
-              <a:rPr lang="en-US" sz="1400" dirty="0">
-                <a:solidFill>
-                  <a:schemeClr val="tx1"/>
-                </a:solidFill>
-              </a:rPr>
-              <a:t>: false</a:t>
-            </a:r>
-            <a:endParaRPr lang="en-SG" sz="1400" dirty="0">
-              <a:solidFill>
-                <a:schemeClr val="tx1"/>
-              </a:solidFill>
-            </a:endParaRPr>
-          </a:p>
-        </p:txBody>
-      </p:sp>
-      <p:sp>
-        <p:nvSpPr>
           <p:cNvPr id="29" name="Rectangle 28">
             <a:extLst>
               <a:ext uri="{FF2B5EF4-FFF2-40B4-BE49-F238E27FC236}">
@@ -4586,10 +4128,10 @@
       </p:sp>
       <p:sp>
         <p:nvSpPr>
-          <p:cNvPr id="33" name="Rectangle 32">
-            <a:extLst>
-              <a:ext uri="{FF2B5EF4-FFF2-40B4-BE49-F238E27FC236}">
-                <a16:creationId xmlns:a16="http://schemas.microsoft.com/office/drawing/2014/main" id="{72ECE73A-266E-4247-8BA5-4313590DE5D8}"/>
+          <p:cNvPr id="40" name="Rectangle 39">
+            <a:extLst>
+              <a:ext uri="{FF2B5EF4-FFF2-40B4-BE49-F238E27FC236}">
+                <a16:creationId xmlns:a16="http://schemas.microsoft.com/office/drawing/2014/main" id="{B3D6955C-180C-4A2B-B15C-17D61C8F220A}"/>
               </a:ext>
             </a:extLst>
           </p:cNvPr>
@@ -4598,61 +4140,7 @@
         </p:nvSpPr>
         <p:spPr>
           <a:xfrm>
-            <a:off x="1249960" y="4378259"/>
-            <a:ext cx="8397379" cy="1979802"/>
-          </a:xfrm>
-          <a:prstGeom prst="rect">
-            <a:avLst/>
-          </a:prstGeom>
-          <a:solidFill>
-            <a:schemeClr val="bg1"/>
-          </a:solidFill>
-          <a:ln>
-            <a:solidFill>
-              <a:schemeClr val="bg1"/>
-            </a:solidFill>
-          </a:ln>
-        </p:spPr>
-        <p:style>
-          <a:lnRef idx="2">
-            <a:schemeClr val="accent1">
-              <a:shade val="50000"/>
-            </a:schemeClr>
-          </a:lnRef>
-          <a:fillRef idx="1">
-            <a:schemeClr val="accent1"/>
-          </a:fillRef>
-          <a:effectRef idx="0">
-            <a:schemeClr val="accent1"/>
-          </a:effectRef>
-          <a:fontRef idx="minor">
-            <a:schemeClr val="lt1"/>
-          </a:fontRef>
-        </p:style>
-        <p:txBody>
-          <a:bodyPr rtlCol="0" anchor="ctr"/>
-          <a:lstStyle/>
-          <a:p>
-            <a:pPr algn="ctr"/>
-            <a:endParaRPr lang="en-SG"/>
-          </a:p>
-        </p:txBody>
-      </p:sp>
-      <p:sp>
-        <p:nvSpPr>
-          <p:cNvPr id="34" name="Rectangle 33">
-            <a:extLst>
-              <a:ext uri="{FF2B5EF4-FFF2-40B4-BE49-F238E27FC236}">
-                <a16:creationId xmlns:a16="http://schemas.microsoft.com/office/drawing/2014/main" id="{3FFAC8B8-1848-489A-B6D4-242EC1B66BB2}"/>
-              </a:ext>
-            </a:extLst>
-          </p:cNvPr>
-          <p:cNvSpPr/>
-          <p:nvPr/>
-        </p:nvSpPr>
-        <p:spPr>
-          <a:xfrm>
-            <a:off x="1753299" y="4554428"/>
+            <a:off x="5601049" y="4773748"/>
             <a:ext cx="3548543" cy="1553361"/>
           </a:xfrm>
           <a:prstGeom prst="rect">
@@ -4692,10 +4180,10 @@
       </p:sp>
       <p:sp>
         <p:nvSpPr>
-          <p:cNvPr id="35" name="TextBox 34">
-            <a:extLst>
-              <a:ext uri="{FF2B5EF4-FFF2-40B4-BE49-F238E27FC236}">
-                <a16:creationId xmlns:a16="http://schemas.microsoft.com/office/drawing/2014/main" id="{253EFB9D-B035-4839-985C-167F641C6308}"/>
+          <p:cNvPr id="41" name="TextBox 40">
+            <a:extLst>
+              <a:ext uri="{FF2B5EF4-FFF2-40B4-BE49-F238E27FC236}">
+                <a16:creationId xmlns:a16="http://schemas.microsoft.com/office/drawing/2014/main" id="{C697C4EA-53E0-4C48-9809-D36364801282}"/>
               </a:ext>
             </a:extLst>
           </p:cNvPr>
@@ -4704,8 +4192,8 @@
         </p:nvSpPr>
         <p:spPr>
           <a:xfrm>
-            <a:off x="2927757" y="4636820"/>
-            <a:ext cx="1199626" cy="338554"/>
+            <a:off x="6253991" y="4855391"/>
+            <a:ext cx="2242658" cy="338554"/>
           </a:xfrm>
           <a:prstGeom prst="rect">
             <a:avLst/>
@@ -4720,8 +4208,8 @@
           <a:p>
             <a:pPr algn="ctr"/>
             <a:r>
-              <a:rPr lang="en-US" sz="1600" dirty="0" err="1"/>
-              <a:t>ClientList</a:t>
+              <a:rPr lang="en-US" sz="1600" dirty="0"/>
+              <a:t>User’s View: Archive</a:t>
             </a:r>
             <a:endParaRPr lang="en-SG" dirty="0"/>
           </a:p>
@@ -4729,10 +4217,10 @@
       </p:sp>
       <p:sp>
         <p:nvSpPr>
-          <p:cNvPr id="36" name="Rectangle 35">
-            <a:extLst>
-              <a:ext uri="{FF2B5EF4-FFF2-40B4-BE49-F238E27FC236}">
-                <a16:creationId xmlns:a16="http://schemas.microsoft.com/office/drawing/2014/main" id="{7147EE58-41D7-4AEA-9E4D-97E95F1F8CAD}"/>
+          <p:cNvPr id="42" name="Rectangle 41">
+            <a:extLst>
+              <a:ext uri="{FF2B5EF4-FFF2-40B4-BE49-F238E27FC236}">
+                <a16:creationId xmlns:a16="http://schemas.microsoft.com/office/drawing/2014/main" id="{4624E4F6-397B-4F9D-B07B-29D60362AA7A}"/>
               </a:ext>
             </a:extLst>
           </p:cNvPr>
@@ -4741,7 +4229,7 @@
         </p:nvSpPr>
         <p:spPr>
           <a:xfrm>
-            <a:off x="3826778" y="5191696"/>
+            <a:off x="7621399" y="5410267"/>
             <a:ext cx="1279321" cy="338554"/>
           </a:xfrm>
           <a:prstGeom prst="rect">
@@ -4795,10 +4283,10 @@
       </p:sp>
       <p:sp>
         <p:nvSpPr>
-          <p:cNvPr id="37" name="Rectangle 36">
-            <a:extLst>
-              <a:ext uri="{FF2B5EF4-FFF2-40B4-BE49-F238E27FC236}">
-                <a16:creationId xmlns:a16="http://schemas.microsoft.com/office/drawing/2014/main" id="{49C1153A-3B9A-48F1-AD44-3CA0BE48AAC3}"/>
+          <p:cNvPr id="43" name="Rectangle 42">
+            <a:extLst>
+              <a:ext uri="{FF2B5EF4-FFF2-40B4-BE49-F238E27FC236}">
+                <a16:creationId xmlns:a16="http://schemas.microsoft.com/office/drawing/2014/main" id="{BFCD6517-019F-43B5-8B1C-EB49DA5CF95A}"/>
               </a:ext>
             </a:extLst>
           </p:cNvPr>
@@ -4807,8 +4295,8 @@
         </p:nvSpPr>
         <p:spPr>
           <a:xfrm>
-            <a:off x="3826778" y="5511474"/>
-            <a:ext cx="1279321" cy="338554"/>
+            <a:off x="3702340" y="943168"/>
+            <a:ext cx="1371600" cy="338554"/>
           </a:xfrm>
           <a:prstGeom prst="rect">
             <a:avLst/>
@@ -4844,30 +4332,14 @@
           <a:p>
             <a:pPr algn="ctr"/>
             <a:r>
-              <a:rPr lang="en-US" sz="1400" dirty="0" err="1">
+              <a:rPr lang="en-US" sz="1400" u="sng" dirty="0" err="1">
                 <a:solidFill>
                   <a:schemeClr val="tx1"/>
                 </a:solidFill>
               </a:rPr>
-              <a:t>isArchive</a:t>
-            </a:r>
-            <a:r>
-              <a:rPr lang="en-US" sz="1400" dirty="0">
-                <a:solidFill>
-                  <a:schemeClr val="tx1"/>
-                </a:solidFill>
-              </a:rPr>
-              <a:t>: </a:t>
-            </a:r>
-            <a:r>
-              <a:rPr lang="en-US" sz="1400" b="1" dirty="0">
-                <a:solidFill>
-                  <a:schemeClr val="tx1"/>
-                </a:solidFill>
-              </a:rPr>
-              <a:t>true</a:t>
-            </a:r>
-            <a:endParaRPr lang="en-SG" sz="1400" b="1" dirty="0">
+              <a:t>ben:Person</a:t>
+            </a:r>
+            <a:endParaRPr lang="en-SG" sz="1400" u="sng" dirty="0">
               <a:solidFill>
                 <a:schemeClr val="tx1"/>
               </a:solidFill>
@@ -4877,10 +4349,10 @@
       </p:sp>
       <p:sp>
         <p:nvSpPr>
-          <p:cNvPr id="38" name="Rectangle 37">
-            <a:extLst>
-              <a:ext uri="{FF2B5EF4-FFF2-40B4-BE49-F238E27FC236}">
-                <a16:creationId xmlns:a16="http://schemas.microsoft.com/office/drawing/2014/main" id="{D35BAB16-A973-4234-8931-BE9CA9B68BA2}"/>
+          <p:cNvPr id="44" name="Rectangle 43">
+            <a:extLst>
+              <a:ext uri="{FF2B5EF4-FFF2-40B4-BE49-F238E27FC236}">
+                <a16:creationId xmlns:a16="http://schemas.microsoft.com/office/drawing/2014/main" id="{F255405B-BE82-4B3E-92AE-B2035EA1DAFA}"/>
               </a:ext>
             </a:extLst>
           </p:cNvPr>
@@ -4889,8 +4361,8 @@
         </p:nvSpPr>
         <p:spPr>
           <a:xfrm>
-            <a:off x="1957431" y="5192898"/>
-            <a:ext cx="1279321" cy="338554"/>
+            <a:off x="3702340" y="1262946"/>
+            <a:ext cx="1371600" cy="338554"/>
           </a:xfrm>
           <a:prstGeom prst="rect">
             <a:avLst/>
@@ -4926,14 +4398,22 @@
           <a:p>
             <a:pPr algn="ctr"/>
             <a:r>
-              <a:rPr lang="en-US" sz="1400" u="sng" dirty="0" err="1">
+              <a:rPr lang="en-US" sz="1400" dirty="0" err="1">
                 <a:solidFill>
                   <a:schemeClr val="tx1"/>
                 </a:solidFill>
               </a:rPr>
-              <a:t>david:Person</a:t>
-            </a:r>
-            <a:endParaRPr lang="en-SG" sz="1400" u="sng" dirty="0">
+              <a:t>isArchive</a:t>
+            </a:r>
+            <a:r>
+              <a:rPr lang="en-US" sz="1400" dirty="0">
+                <a:solidFill>
+                  <a:schemeClr val="tx1"/>
+                </a:solidFill>
+              </a:rPr>
+              <a:t> = false</a:t>
+            </a:r>
+            <a:endParaRPr lang="en-SG" sz="1400" dirty="0">
               <a:solidFill>
                 <a:schemeClr val="tx1"/>
               </a:solidFill>
@@ -4943,10 +4423,10 @@
       </p:sp>
       <p:sp>
         <p:nvSpPr>
-          <p:cNvPr id="39" name="Rectangle 38">
-            <a:extLst>
-              <a:ext uri="{FF2B5EF4-FFF2-40B4-BE49-F238E27FC236}">
-                <a16:creationId xmlns:a16="http://schemas.microsoft.com/office/drawing/2014/main" id="{975023D2-0164-495D-AD60-0E11A5CF0A2E}"/>
+          <p:cNvPr id="45" name="Rectangle 44">
+            <a:extLst>
+              <a:ext uri="{FF2B5EF4-FFF2-40B4-BE49-F238E27FC236}">
+                <a16:creationId xmlns:a16="http://schemas.microsoft.com/office/drawing/2014/main" id="{17185729-CFA4-4ECB-9EEF-D08743748B88}"/>
               </a:ext>
             </a:extLst>
           </p:cNvPr>
@@ -4955,8 +4435,97 @@
         </p:nvSpPr>
         <p:spPr>
           <a:xfrm>
-            <a:off x="1957431" y="5512676"/>
-            <a:ext cx="1279321" cy="338554"/>
+            <a:off x="1753299" y="2574626"/>
+            <a:ext cx="3548543" cy="1553361"/>
+          </a:xfrm>
+          <a:prstGeom prst="rect">
+            <a:avLst/>
+          </a:prstGeom>
+          <a:noFill/>
+          <a:ln>
+            <a:solidFill>
+              <a:schemeClr val="tx1"/>
+            </a:solidFill>
+          </a:ln>
+        </p:spPr>
+        <p:style>
+          <a:lnRef idx="2">
+            <a:schemeClr val="accent1">
+              <a:shade val="50000"/>
+            </a:schemeClr>
+          </a:lnRef>
+          <a:fillRef idx="1">
+            <a:schemeClr val="accent1"/>
+          </a:fillRef>
+          <a:effectRef idx="0">
+            <a:schemeClr val="accent1"/>
+          </a:effectRef>
+          <a:fontRef idx="minor">
+            <a:schemeClr val="lt1"/>
+          </a:fontRef>
+        </p:style>
+        <p:txBody>
+          <a:bodyPr rtlCol="0" anchor="ctr"/>
+          <a:lstStyle/>
+          <a:p>
+            <a:pPr algn="ctr"/>
+            <a:endParaRPr lang="en-SG"/>
+          </a:p>
+        </p:txBody>
+      </p:sp>
+      <p:sp>
+        <p:nvSpPr>
+          <p:cNvPr id="46" name="TextBox 45">
+            <a:extLst>
+              <a:ext uri="{FF2B5EF4-FFF2-40B4-BE49-F238E27FC236}">
+                <a16:creationId xmlns:a16="http://schemas.microsoft.com/office/drawing/2014/main" id="{2614A35B-805A-46F3-9026-CF26E0513EF3}"/>
+              </a:ext>
+            </a:extLst>
+          </p:cNvPr>
+          <p:cNvSpPr txBox="1"/>
+          <p:nvPr/>
+        </p:nvSpPr>
+        <p:spPr>
+          <a:xfrm>
+            <a:off x="2927757" y="2657018"/>
+            <a:ext cx="1199626" cy="338554"/>
+          </a:xfrm>
+          <a:prstGeom prst="rect">
+            <a:avLst/>
+          </a:prstGeom>
+          <a:noFill/>
+        </p:spPr>
+        <p:txBody>
+          <a:bodyPr wrap="square" rtlCol="0">
+            <a:spAutoFit/>
+          </a:bodyPr>
+          <a:lstStyle/>
+          <a:p>
+            <a:pPr algn="ctr"/>
+            <a:r>
+              <a:rPr lang="en-US" sz="1600" dirty="0" err="1"/>
+              <a:t>ClientList</a:t>
+            </a:r>
+            <a:endParaRPr lang="en-SG" dirty="0"/>
+          </a:p>
+        </p:txBody>
+      </p:sp>
+      <p:sp>
+        <p:nvSpPr>
+          <p:cNvPr id="47" name="Rectangle 46">
+            <a:extLst>
+              <a:ext uri="{FF2B5EF4-FFF2-40B4-BE49-F238E27FC236}">
+                <a16:creationId xmlns:a16="http://schemas.microsoft.com/office/drawing/2014/main" id="{D569E36A-DB29-41DA-AEF3-CAE5099A7301}"/>
+              </a:ext>
+            </a:extLst>
+          </p:cNvPr>
+          <p:cNvSpPr/>
+          <p:nvPr/>
+        </p:nvSpPr>
+        <p:spPr>
+          <a:xfrm>
+            <a:off x="1957431" y="3213096"/>
+            <a:ext cx="1371600" cy="338554"/>
           </a:xfrm>
           <a:prstGeom prst="rect">
             <a:avLst/>
@@ -4992,22 +4561,14 @@
           <a:p>
             <a:pPr algn="ctr"/>
             <a:r>
-              <a:rPr lang="en-US" sz="1400" dirty="0" err="1">
+              <a:rPr lang="en-US" sz="1400" u="sng" dirty="0" err="1">
                 <a:solidFill>
                   <a:schemeClr val="tx1"/>
                 </a:solidFill>
               </a:rPr>
-              <a:t>isArchive</a:t>
-            </a:r>
-            <a:r>
-              <a:rPr lang="en-US" sz="1400" dirty="0">
-                <a:solidFill>
-                  <a:schemeClr val="tx1"/>
-                </a:solidFill>
-              </a:rPr>
-              <a:t>: false</a:t>
-            </a:r>
-            <a:endParaRPr lang="en-SG" sz="1400" dirty="0">
+              <a:t>david:Person</a:t>
+            </a:r>
+            <a:endParaRPr lang="en-SG" sz="1400" u="sng" dirty="0">
               <a:solidFill>
                 <a:schemeClr val="tx1"/>
               </a:solidFill>
@@ -5017,10 +4578,10 @@
       </p:sp>
       <p:sp>
         <p:nvSpPr>
-          <p:cNvPr id="40" name="Rectangle 39">
-            <a:extLst>
-              <a:ext uri="{FF2B5EF4-FFF2-40B4-BE49-F238E27FC236}">
-                <a16:creationId xmlns:a16="http://schemas.microsoft.com/office/drawing/2014/main" id="{B3D6955C-180C-4A2B-B15C-17D61C8F220A}"/>
+          <p:cNvPr id="48" name="Rectangle 47">
+            <a:extLst>
+              <a:ext uri="{FF2B5EF4-FFF2-40B4-BE49-F238E27FC236}">
+                <a16:creationId xmlns:a16="http://schemas.microsoft.com/office/drawing/2014/main" id="{74A6DDB5-782B-4D9D-8186-243188368751}"/>
               </a:ext>
             </a:extLst>
           </p:cNvPr>
@@ -5029,97 +4590,8 @@
         </p:nvSpPr>
         <p:spPr>
           <a:xfrm>
-            <a:off x="5601049" y="4555177"/>
-            <a:ext cx="3548543" cy="1553361"/>
-          </a:xfrm>
-          <a:prstGeom prst="rect">
-            <a:avLst/>
-          </a:prstGeom>
-          <a:noFill/>
-          <a:ln>
-            <a:solidFill>
-              <a:schemeClr val="tx1"/>
-            </a:solidFill>
-          </a:ln>
-        </p:spPr>
-        <p:style>
-          <a:lnRef idx="2">
-            <a:schemeClr val="accent1">
-              <a:shade val="50000"/>
-            </a:schemeClr>
-          </a:lnRef>
-          <a:fillRef idx="1">
-            <a:schemeClr val="accent1"/>
-          </a:fillRef>
-          <a:effectRef idx="0">
-            <a:schemeClr val="accent1"/>
-          </a:effectRef>
-          <a:fontRef idx="minor">
-            <a:schemeClr val="lt1"/>
-          </a:fontRef>
-        </p:style>
-        <p:txBody>
-          <a:bodyPr rtlCol="0" anchor="ctr"/>
-          <a:lstStyle/>
-          <a:p>
-            <a:pPr algn="ctr"/>
-            <a:endParaRPr lang="en-SG"/>
-          </a:p>
-        </p:txBody>
-      </p:sp>
-      <p:sp>
-        <p:nvSpPr>
-          <p:cNvPr id="41" name="TextBox 40">
-            <a:extLst>
-              <a:ext uri="{FF2B5EF4-FFF2-40B4-BE49-F238E27FC236}">
-                <a16:creationId xmlns:a16="http://schemas.microsoft.com/office/drawing/2014/main" id="{C697C4EA-53E0-4C48-9809-D36364801282}"/>
-              </a:ext>
-            </a:extLst>
-          </p:cNvPr>
-          <p:cNvSpPr txBox="1"/>
-          <p:nvPr/>
-        </p:nvSpPr>
-        <p:spPr>
-          <a:xfrm>
-            <a:off x="6253991" y="4636820"/>
-            <a:ext cx="2242658" cy="338554"/>
-          </a:xfrm>
-          <a:prstGeom prst="rect">
-            <a:avLst/>
-          </a:prstGeom>
-          <a:noFill/>
-        </p:spPr>
-        <p:txBody>
-          <a:bodyPr wrap="square" rtlCol="0">
-            <a:spAutoFit/>
-          </a:bodyPr>
-          <a:lstStyle/>
-          <a:p>
-            <a:pPr algn="ctr"/>
-            <a:r>
-              <a:rPr lang="en-US" sz="1600" dirty="0"/>
-              <a:t>User’s View: Archive</a:t>
-            </a:r>
-            <a:endParaRPr lang="en-SG" dirty="0"/>
-          </a:p>
-        </p:txBody>
-      </p:sp>
-      <p:sp>
-        <p:nvSpPr>
-          <p:cNvPr id="42" name="Rectangle 41">
-            <a:extLst>
-              <a:ext uri="{FF2B5EF4-FFF2-40B4-BE49-F238E27FC236}">
-                <a16:creationId xmlns:a16="http://schemas.microsoft.com/office/drawing/2014/main" id="{4624E4F6-397B-4F9D-B07B-29D60362AA7A}"/>
-              </a:ext>
-            </a:extLst>
-          </p:cNvPr>
-          <p:cNvSpPr/>
-          <p:nvPr/>
-        </p:nvSpPr>
-        <p:spPr>
-          <a:xfrm>
-            <a:off x="7621399" y="5191696"/>
-            <a:ext cx="1279321" cy="338554"/>
+            <a:off x="1957431" y="3532874"/>
+            <a:ext cx="1371600" cy="338554"/>
           </a:xfrm>
           <a:prstGeom prst="rect">
             <a:avLst/>
@@ -5155,6 +4627,80 @@
           <a:p>
             <a:pPr algn="ctr"/>
             <a:r>
+              <a:rPr lang="en-US" sz="1400" dirty="0" err="1">
+                <a:solidFill>
+                  <a:schemeClr val="tx1"/>
+                </a:solidFill>
+              </a:rPr>
+              <a:t>isArchive</a:t>
+            </a:r>
+            <a:r>
+              <a:rPr lang="en-US" sz="1400" dirty="0">
+                <a:solidFill>
+                  <a:schemeClr val="tx1"/>
+                </a:solidFill>
+              </a:rPr>
+              <a:t> = false</a:t>
+            </a:r>
+            <a:endParaRPr lang="en-SG" sz="1400" dirty="0">
+              <a:solidFill>
+                <a:schemeClr val="tx1"/>
+              </a:solidFill>
+            </a:endParaRPr>
+          </a:p>
+        </p:txBody>
+      </p:sp>
+      <p:sp>
+        <p:nvSpPr>
+          <p:cNvPr id="49" name="Rectangle 48">
+            <a:extLst>
+              <a:ext uri="{FF2B5EF4-FFF2-40B4-BE49-F238E27FC236}">
+                <a16:creationId xmlns:a16="http://schemas.microsoft.com/office/drawing/2014/main" id="{20B33913-9F16-451F-8733-957E71A6E49F}"/>
+              </a:ext>
+            </a:extLst>
+          </p:cNvPr>
+          <p:cNvSpPr/>
+          <p:nvPr/>
+        </p:nvSpPr>
+        <p:spPr>
+          <a:xfrm>
+            <a:off x="3702340" y="3215790"/>
+            <a:ext cx="1371600" cy="338554"/>
+          </a:xfrm>
+          <a:prstGeom prst="rect">
+            <a:avLst/>
+          </a:prstGeom>
+          <a:solidFill>
+            <a:srgbClr val="FFFF00"/>
+          </a:solidFill>
+          <a:ln>
+            <a:solidFill>
+              <a:schemeClr val="tx1"/>
+            </a:solidFill>
+          </a:ln>
+        </p:spPr>
+        <p:style>
+          <a:lnRef idx="2">
+            <a:schemeClr val="accent1">
+              <a:shade val="50000"/>
+            </a:schemeClr>
+          </a:lnRef>
+          <a:fillRef idx="1">
+            <a:schemeClr val="accent1"/>
+          </a:fillRef>
+          <a:effectRef idx="0">
+            <a:schemeClr val="accent1"/>
+          </a:effectRef>
+          <a:fontRef idx="minor">
+            <a:schemeClr val="lt1"/>
+          </a:fontRef>
+        </p:style>
+        <p:txBody>
+          <a:bodyPr rtlCol="0" anchor="ctr"/>
+          <a:lstStyle/>
+          <a:p>
+            <a:pPr algn="ctr"/>
+            <a:r>
               <a:rPr lang="en-US" sz="1400" u="sng" dirty="0" err="1">
                 <a:solidFill>
                   <a:schemeClr val="tx1"/>
@@ -5163,6 +4709,465 @@
               <a:t>ben:Person</a:t>
             </a:r>
             <a:endParaRPr lang="en-SG" sz="1400" u="sng" dirty="0">
+              <a:solidFill>
+                <a:schemeClr val="tx1"/>
+              </a:solidFill>
+            </a:endParaRPr>
+          </a:p>
+        </p:txBody>
+      </p:sp>
+      <p:sp>
+        <p:nvSpPr>
+          <p:cNvPr id="50" name="Rectangle 49">
+            <a:extLst>
+              <a:ext uri="{FF2B5EF4-FFF2-40B4-BE49-F238E27FC236}">
+                <a16:creationId xmlns:a16="http://schemas.microsoft.com/office/drawing/2014/main" id="{A2D4DF4A-0384-42A0-BEBF-F17CCCCB61C2}"/>
+              </a:ext>
+            </a:extLst>
+          </p:cNvPr>
+          <p:cNvSpPr/>
+          <p:nvPr/>
+        </p:nvSpPr>
+        <p:spPr>
+          <a:xfrm>
+            <a:off x="3702340" y="3535568"/>
+            <a:ext cx="1371600" cy="338554"/>
+          </a:xfrm>
+          <a:prstGeom prst="rect">
+            <a:avLst/>
+          </a:prstGeom>
+          <a:solidFill>
+            <a:srgbClr val="FFFF00"/>
+          </a:solidFill>
+          <a:ln>
+            <a:solidFill>
+              <a:schemeClr val="tx1"/>
+            </a:solidFill>
+          </a:ln>
+        </p:spPr>
+        <p:style>
+          <a:lnRef idx="2">
+            <a:schemeClr val="accent1">
+              <a:shade val="50000"/>
+            </a:schemeClr>
+          </a:lnRef>
+          <a:fillRef idx="1">
+            <a:schemeClr val="accent1"/>
+          </a:fillRef>
+          <a:effectRef idx="0">
+            <a:schemeClr val="accent1"/>
+          </a:effectRef>
+          <a:fontRef idx="minor">
+            <a:schemeClr val="lt1"/>
+          </a:fontRef>
+        </p:style>
+        <p:txBody>
+          <a:bodyPr rtlCol="0" anchor="ctr"/>
+          <a:lstStyle/>
+          <a:p>
+            <a:pPr algn="ctr"/>
+            <a:r>
+              <a:rPr lang="en-US" sz="1400" dirty="0" err="1">
+                <a:solidFill>
+                  <a:schemeClr val="tx1"/>
+                </a:solidFill>
+              </a:rPr>
+              <a:t>isArchive</a:t>
+            </a:r>
+            <a:r>
+              <a:rPr lang="en-US" sz="1400" dirty="0">
+                <a:solidFill>
+                  <a:schemeClr val="tx1"/>
+                </a:solidFill>
+              </a:rPr>
+              <a:t> = </a:t>
+            </a:r>
+            <a:r>
+              <a:rPr lang="en-US" sz="1400" b="1" dirty="0">
+                <a:solidFill>
+                  <a:schemeClr val="tx1"/>
+                </a:solidFill>
+              </a:rPr>
+              <a:t>true</a:t>
+            </a:r>
+            <a:endParaRPr lang="en-SG" sz="1400" b="1" dirty="0">
+              <a:solidFill>
+                <a:schemeClr val="tx1"/>
+              </a:solidFill>
+            </a:endParaRPr>
+          </a:p>
+        </p:txBody>
+      </p:sp>
+      <p:sp>
+        <p:nvSpPr>
+          <p:cNvPr id="51" name="Rectangle 50">
+            <a:extLst>
+              <a:ext uri="{FF2B5EF4-FFF2-40B4-BE49-F238E27FC236}">
+                <a16:creationId xmlns:a16="http://schemas.microsoft.com/office/drawing/2014/main" id="{FA6A498B-49DD-4EEE-9CD2-544CDAB2DA56}"/>
+              </a:ext>
+            </a:extLst>
+          </p:cNvPr>
+          <p:cNvSpPr/>
+          <p:nvPr/>
+        </p:nvSpPr>
+        <p:spPr>
+          <a:xfrm>
+            <a:off x="1753299" y="4773748"/>
+            <a:ext cx="3548543" cy="1553361"/>
+          </a:xfrm>
+          <a:prstGeom prst="rect">
+            <a:avLst/>
+          </a:prstGeom>
+          <a:noFill/>
+          <a:ln>
+            <a:solidFill>
+              <a:schemeClr val="tx1"/>
+            </a:solidFill>
+          </a:ln>
+        </p:spPr>
+        <p:style>
+          <a:lnRef idx="2">
+            <a:schemeClr val="accent1">
+              <a:shade val="50000"/>
+            </a:schemeClr>
+          </a:lnRef>
+          <a:fillRef idx="1">
+            <a:schemeClr val="accent1"/>
+          </a:fillRef>
+          <a:effectRef idx="0">
+            <a:schemeClr val="accent1"/>
+          </a:effectRef>
+          <a:fontRef idx="minor">
+            <a:schemeClr val="lt1"/>
+          </a:fontRef>
+        </p:style>
+        <p:txBody>
+          <a:bodyPr rtlCol="0" anchor="ctr"/>
+          <a:lstStyle/>
+          <a:p>
+            <a:pPr algn="ctr"/>
+            <a:endParaRPr lang="en-SG"/>
+          </a:p>
+        </p:txBody>
+      </p:sp>
+      <p:sp>
+        <p:nvSpPr>
+          <p:cNvPr id="52" name="TextBox 51">
+            <a:extLst>
+              <a:ext uri="{FF2B5EF4-FFF2-40B4-BE49-F238E27FC236}">
+                <a16:creationId xmlns:a16="http://schemas.microsoft.com/office/drawing/2014/main" id="{1A238B9E-3A38-42DE-9136-FA92C6C35D45}"/>
+              </a:ext>
+            </a:extLst>
+          </p:cNvPr>
+          <p:cNvSpPr txBox="1"/>
+          <p:nvPr/>
+        </p:nvSpPr>
+        <p:spPr>
+          <a:xfrm>
+            <a:off x="2927757" y="4856140"/>
+            <a:ext cx="1199626" cy="338554"/>
+          </a:xfrm>
+          <a:prstGeom prst="rect">
+            <a:avLst/>
+          </a:prstGeom>
+          <a:noFill/>
+        </p:spPr>
+        <p:txBody>
+          <a:bodyPr wrap="square" rtlCol="0">
+            <a:spAutoFit/>
+          </a:bodyPr>
+          <a:lstStyle/>
+          <a:p>
+            <a:pPr algn="ctr"/>
+            <a:r>
+              <a:rPr lang="en-US" sz="1600" dirty="0" err="1"/>
+              <a:t>ClientList</a:t>
+            </a:r>
+            <a:endParaRPr lang="en-SG" dirty="0"/>
+          </a:p>
+        </p:txBody>
+      </p:sp>
+      <p:sp>
+        <p:nvSpPr>
+          <p:cNvPr id="53" name="Rectangle 52">
+            <a:extLst>
+              <a:ext uri="{FF2B5EF4-FFF2-40B4-BE49-F238E27FC236}">
+                <a16:creationId xmlns:a16="http://schemas.microsoft.com/office/drawing/2014/main" id="{E23B63E2-41F4-446B-854F-C6E52078733F}"/>
+              </a:ext>
+            </a:extLst>
+          </p:cNvPr>
+          <p:cNvSpPr/>
+          <p:nvPr/>
+        </p:nvSpPr>
+        <p:spPr>
+          <a:xfrm>
+            <a:off x="1957431" y="5412218"/>
+            <a:ext cx="1371600" cy="338554"/>
+          </a:xfrm>
+          <a:prstGeom prst="rect">
+            <a:avLst/>
+          </a:prstGeom>
+          <a:solidFill>
+            <a:srgbClr val="FFFF00"/>
+          </a:solidFill>
+          <a:ln>
+            <a:solidFill>
+              <a:schemeClr val="tx1"/>
+            </a:solidFill>
+          </a:ln>
+        </p:spPr>
+        <p:style>
+          <a:lnRef idx="2">
+            <a:schemeClr val="accent1">
+              <a:shade val="50000"/>
+            </a:schemeClr>
+          </a:lnRef>
+          <a:fillRef idx="1">
+            <a:schemeClr val="accent1"/>
+          </a:fillRef>
+          <a:effectRef idx="0">
+            <a:schemeClr val="accent1"/>
+          </a:effectRef>
+          <a:fontRef idx="minor">
+            <a:schemeClr val="lt1"/>
+          </a:fontRef>
+        </p:style>
+        <p:txBody>
+          <a:bodyPr rtlCol="0" anchor="ctr"/>
+          <a:lstStyle/>
+          <a:p>
+            <a:pPr algn="ctr"/>
+            <a:r>
+              <a:rPr lang="en-US" sz="1400" u="sng" dirty="0" err="1">
+                <a:solidFill>
+                  <a:schemeClr val="tx1"/>
+                </a:solidFill>
+              </a:rPr>
+              <a:t>david:Person</a:t>
+            </a:r>
+            <a:endParaRPr lang="en-SG" sz="1400" u="sng" dirty="0">
+              <a:solidFill>
+                <a:schemeClr val="tx1"/>
+              </a:solidFill>
+            </a:endParaRPr>
+          </a:p>
+        </p:txBody>
+      </p:sp>
+      <p:sp>
+        <p:nvSpPr>
+          <p:cNvPr id="54" name="Rectangle 53">
+            <a:extLst>
+              <a:ext uri="{FF2B5EF4-FFF2-40B4-BE49-F238E27FC236}">
+                <a16:creationId xmlns:a16="http://schemas.microsoft.com/office/drawing/2014/main" id="{DDB6167A-8A78-4EAB-81C3-5E75F086C4DE}"/>
+              </a:ext>
+            </a:extLst>
+          </p:cNvPr>
+          <p:cNvSpPr/>
+          <p:nvPr/>
+        </p:nvSpPr>
+        <p:spPr>
+          <a:xfrm>
+            <a:off x="1957431" y="5731996"/>
+            <a:ext cx="1371600" cy="338554"/>
+          </a:xfrm>
+          <a:prstGeom prst="rect">
+            <a:avLst/>
+          </a:prstGeom>
+          <a:solidFill>
+            <a:srgbClr val="FFFF00"/>
+          </a:solidFill>
+          <a:ln>
+            <a:solidFill>
+              <a:schemeClr val="tx1"/>
+            </a:solidFill>
+          </a:ln>
+        </p:spPr>
+        <p:style>
+          <a:lnRef idx="2">
+            <a:schemeClr val="accent1">
+              <a:shade val="50000"/>
+            </a:schemeClr>
+          </a:lnRef>
+          <a:fillRef idx="1">
+            <a:schemeClr val="accent1"/>
+          </a:fillRef>
+          <a:effectRef idx="0">
+            <a:schemeClr val="accent1"/>
+          </a:effectRef>
+          <a:fontRef idx="minor">
+            <a:schemeClr val="lt1"/>
+          </a:fontRef>
+        </p:style>
+        <p:txBody>
+          <a:bodyPr rtlCol="0" anchor="ctr"/>
+          <a:lstStyle/>
+          <a:p>
+            <a:pPr algn="ctr"/>
+            <a:r>
+              <a:rPr lang="en-US" sz="1400" dirty="0" err="1">
+                <a:solidFill>
+                  <a:schemeClr val="tx1"/>
+                </a:solidFill>
+              </a:rPr>
+              <a:t>isArchive</a:t>
+            </a:r>
+            <a:r>
+              <a:rPr lang="en-US" sz="1400" dirty="0">
+                <a:solidFill>
+                  <a:schemeClr val="tx1"/>
+                </a:solidFill>
+              </a:rPr>
+              <a:t> = false</a:t>
+            </a:r>
+            <a:endParaRPr lang="en-SG" sz="1400" dirty="0">
+              <a:solidFill>
+                <a:schemeClr val="tx1"/>
+              </a:solidFill>
+            </a:endParaRPr>
+          </a:p>
+        </p:txBody>
+      </p:sp>
+      <p:sp>
+        <p:nvSpPr>
+          <p:cNvPr id="55" name="Rectangle 54">
+            <a:extLst>
+              <a:ext uri="{FF2B5EF4-FFF2-40B4-BE49-F238E27FC236}">
+                <a16:creationId xmlns:a16="http://schemas.microsoft.com/office/drawing/2014/main" id="{A7ED0EDE-E856-4CD7-8864-300C810911F7}"/>
+              </a:ext>
+            </a:extLst>
+          </p:cNvPr>
+          <p:cNvSpPr/>
+          <p:nvPr/>
+        </p:nvSpPr>
+        <p:spPr>
+          <a:xfrm>
+            <a:off x="3702340" y="5414912"/>
+            <a:ext cx="1371600" cy="338554"/>
+          </a:xfrm>
+          <a:prstGeom prst="rect">
+            <a:avLst/>
+          </a:prstGeom>
+          <a:solidFill>
+            <a:srgbClr val="FFFF00"/>
+          </a:solidFill>
+          <a:ln>
+            <a:solidFill>
+              <a:schemeClr val="tx1"/>
+            </a:solidFill>
+          </a:ln>
+        </p:spPr>
+        <p:style>
+          <a:lnRef idx="2">
+            <a:schemeClr val="accent1">
+              <a:shade val="50000"/>
+            </a:schemeClr>
+          </a:lnRef>
+          <a:fillRef idx="1">
+            <a:schemeClr val="accent1"/>
+          </a:fillRef>
+          <a:effectRef idx="0">
+            <a:schemeClr val="accent1"/>
+          </a:effectRef>
+          <a:fontRef idx="minor">
+            <a:schemeClr val="lt1"/>
+          </a:fontRef>
+        </p:style>
+        <p:txBody>
+          <a:bodyPr rtlCol="0" anchor="ctr"/>
+          <a:lstStyle/>
+          <a:p>
+            <a:pPr algn="ctr"/>
+            <a:r>
+              <a:rPr lang="en-US" sz="1400" u="sng" dirty="0" err="1">
+                <a:solidFill>
+                  <a:schemeClr val="tx1"/>
+                </a:solidFill>
+              </a:rPr>
+              <a:t>ben:Person</a:t>
+            </a:r>
+            <a:endParaRPr lang="en-SG" sz="1400" u="sng" dirty="0">
+              <a:solidFill>
+                <a:schemeClr val="tx1"/>
+              </a:solidFill>
+            </a:endParaRPr>
+          </a:p>
+        </p:txBody>
+      </p:sp>
+      <p:sp>
+        <p:nvSpPr>
+          <p:cNvPr id="56" name="Rectangle 55">
+            <a:extLst>
+              <a:ext uri="{FF2B5EF4-FFF2-40B4-BE49-F238E27FC236}">
+                <a16:creationId xmlns:a16="http://schemas.microsoft.com/office/drawing/2014/main" id="{174C7B21-1E98-489C-955F-D3DE1F2876D6}"/>
+              </a:ext>
+            </a:extLst>
+          </p:cNvPr>
+          <p:cNvSpPr/>
+          <p:nvPr/>
+        </p:nvSpPr>
+        <p:spPr>
+          <a:xfrm>
+            <a:off x="3702340" y="5734690"/>
+            <a:ext cx="1371600" cy="338554"/>
+          </a:xfrm>
+          <a:prstGeom prst="rect">
+            <a:avLst/>
+          </a:prstGeom>
+          <a:solidFill>
+            <a:srgbClr val="FFFF00"/>
+          </a:solidFill>
+          <a:ln>
+            <a:solidFill>
+              <a:schemeClr val="tx1"/>
+            </a:solidFill>
+          </a:ln>
+        </p:spPr>
+        <p:style>
+          <a:lnRef idx="2">
+            <a:schemeClr val="accent1">
+              <a:shade val="50000"/>
+            </a:schemeClr>
+          </a:lnRef>
+          <a:fillRef idx="1">
+            <a:schemeClr val="accent1"/>
+          </a:fillRef>
+          <a:effectRef idx="0">
+            <a:schemeClr val="accent1"/>
+          </a:effectRef>
+          <a:fontRef idx="minor">
+            <a:schemeClr val="lt1"/>
+          </a:fontRef>
+        </p:style>
+        <p:txBody>
+          <a:bodyPr rtlCol="0" anchor="ctr"/>
+          <a:lstStyle/>
+          <a:p>
+            <a:pPr algn="ctr"/>
+            <a:r>
+              <a:rPr lang="en-US" sz="1400" dirty="0" err="1">
+                <a:solidFill>
+                  <a:schemeClr val="tx1"/>
+                </a:solidFill>
+              </a:rPr>
+              <a:t>isArchive</a:t>
+            </a:r>
+            <a:r>
+              <a:rPr lang="en-US" sz="1400" dirty="0">
+                <a:solidFill>
+                  <a:schemeClr val="tx1"/>
+                </a:solidFill>
+              </a:rPr>
+              <a:t> = </a:t>
+            </a:r>
+            <a:r>
+              <a:rPr lang="en-US" sz="1400" b="1" dirty="0">
+                <a:solidFill>
+                  <a:schemeClr val="tx1"/>
+                </a:solidFill>
+              </a:rPr>
+              <a:t>true</a:t>
+            </a:r>
+            <a:endParaRPr lang="en-SG" sz="1400" b="1" dirty="0">
               <a:solidFill>
                 <a:schemeClr val="tx1"/>
               </a:solidFill>

</xml_diff>